<commit_message>
Update Telecom Churn Predictio.pptx
</commit_message>
<xml_diff>
--- a/PPT/Telecom Churn Predictio.pptx
+++ b/PPT/Telecom Churn Predictio.pptx
@@ -17429,7 +17429,7 @@
           <a:p>
             <a:fld id="{48A87A34-81AB-432B-8DAE-1953F412C126}" type="datetimeFigureOut">
               <a:rPr lang="en-US" smtClean="0"/>
-              <a:t>4/26/2023</a:t>
+              <a:t>4/27/2023</a:t>
             </a:fld>
             <a:endParaRPr lang="en-US" dirty="0"/>
           </a:p>
@@ -17609,7 +17609,7 @@
           <a:p>
             <a:fld id="{48A87A34-81AB-432B-8DAE-1953F412C126}" type="datetimeFigureOut">
               <a:rPr lang="en-US" smtClean="0"/>
-              <a:t>4/26/2023</a:t>
+              <a:t>4/27/2023</a:t>
             </a:fld>
             <a:endParaRPr lang="en-US" dirty="0"/>
           </a:p>
@@ -17800,7 +17800,7 @@
             <a:fld id="{48A87A34-81AB-432B-8DAE-1953F412C126}" type="datetimeFigureOut">
               <a:rPr lang="en-US" smtClean="0"/>
               <a:pPr/>
-              <a:t>4/26/2023</a:t>
+              <a:t>4/27/2023</a:t>
             </a:fld>
             <a:endParaRPr lang="en-US" dirty="0"/>
           </a:p>
@@ -18347,7 +18347,7 @@
           <a:p>
             <a:fld id="{48A87A34-81AB-432B-8DAE-1953F412C126}" type="datetimeFigureOut">
               <a:rPr lang="en-US" smtClean="0"/>
-              <a:t>4/26/2023</a:t>
+              <a:t>4/27/2023</a:t>
             </a:fld>
             <a:endParaRPr lang="en-US" dirty="0"/>
           </a:p>
@@ -18626,7 +18626,7 @@
             <a:fld id="{48A87A34-81AB-432B-8DAE-1953F412C126}" type="datetimeFigureOut">
               <a:rPr lang="en-US" smtClean="0"/>
               <a:pPr/>
-              <a:t>4/26/2023</a:t>
+              <a:t>4/27/2023</a:t>
             </a:fld>
             <a:endParaRPr lang="en-US" dirty="0"/>
           </a:p>
@@ -18868,7 +18868,7 @@
           <a:p>
             <a:fld id="{48A87A34-81AB-432B-8DAE-1953F412C126}" type="datetimeFigureOut">
               <a:rPr lang="en-US" smtClean="0"/>
-              <a:t>4/26/2023</a:t>
+              <a:t>4/27/2023</a:t>
             </a:fld>
             <a:endParaRPr lang="en-US" dirty="0"/>
           </a:p>
@@ -19238,7 +19238,7 @@
             <a:fld id="{48A87A34-81AB-432B-8DAE-1953F412C126}" type="datetimeFigureOut">
               <a:rPr lang="en-US" smtClean="0"/>
               <a:pPr/>
-              <a:t>4/26/2023</a:t>
+              <a:t>4/27/2023</a:t>
             </a:fld>
             <a:endParaRPr lang="en-US" dirty="0"/>
           </a:p>
@@ -19389,7 +19389,7 @@
           <a:p>
             <a:fld id="{48A87A34-81AB-432B-8DAE-1953F412C126}" type="datetimeFigureOut">
               <a:rPr lang="en-US" smtClean="0"/>
-              <a:t>4/26/2023</a:t>
+              <a:t>4/27/2023</a:t>
             </a:fld>
             <a:endParaRPr lang="en-US" dirty="0"/>
           </a:p>
@@ -19494,7 +19494,7 @@
           <a:p>
             <a:fld id="{48A87A34-81AB-432B-8DAE-1953F412C126}" type="datetimeFigureOut">
               <a:rPr lang="en-US" smtClean="0"/>
-              <a:t>4/26/2023</a:t>
+              <a:t>4/27/2023</a:t>
             </a:fld>
             <a:endParaRPr lang="en-US" dirty="0"/>
           </a:p>
@@ -19860,7 +19860,7 @@
           <a:p>
             <a:fld id="{48A87A34-81AB-432B-8DAE-1953F412C126}" type="datetimeFigureOut">
               <a:rPr lang="en-US" smtClean="0"/>
-              <a:t>4/26/2023</a:t>
+              <a:t>4/27/2023</a:t>
             </a:fld>
             <a:endParaRPr lang="en-US" dirty="0"/>
           </a:p>
@@ -20227,7 +20227,7 @@
           <a:p>
             <a:fld id="{48A87A34-81AB-432B-8DAE-1953F412C126}" type="datetimeFigureOut">
               <a:rPr lang="en-US" smtClean="0"/>
-              <a:t>4/26/2023</a:t>
+              <a:t>4/27/2023</a:t>
             </a:fld>
             <a:endParaRPr lang="en-US" dirty="0"/>
           </a:p>
@@ -20480,7 +20480,7 @@
             <a:fld id="{48A87A34-81AB-432B-8DAE-1953F412C126}" type="datetimeFigureOut">
               <a:rPr lang="en-US" smtClean="0"/>
               <a:pPr/>
-              <a:t>4/26/2023</a:t>
+              <a:t>4/27/2023</a:t>
             </a:fld>
             <a:endParaRPr lang="en-US" dirty="0"/>
           </a:p>

</xml_diff>